<commit_message>
Add aggregate csv output and update diagram
</commit_message>
<xml_diff>
--- a/docs/DataFlowDiagram.pptx
+++ b/docs/DataFlowDiagram.pptx
@@ -104,6 +104,11 @@
       </a:defRPr>
     </a:lvl9pPr>
   </p:defaultTextStyle>
+  <p:extLst>
+    <p:ext uri="{EFAFB233-063F-42B5-8137-9DF3F51BA10A}">
+      <p15:sldGuideLst xmlns:p15="http://schemas.microsoft.com/office/powerpoint/2012/main"/>
+    </p:ext>
+  </p:extLst>
 </p:presentation>
 </file>
 
@@ -149,10 +154,9 @@
           </a:lstStyle>
           <a:p>
             <a:r>
-              <a:rPr lang="en-US" smtClean="0"/>
+              <a:rPr lang="en-US"/>
               <a:t>Click to edit Master title style</a:t>
             </a:r>
-            <a:endParaRPr lang="en-US"/>
           </a:p>
         </p:txBody>
       </p:sp>
@@ -214,10 +218,9 @@
           </a:lstStyle>
           <a:p>
             <a:r>
-              <a:rPr lang="en-US" smtClean="0"/>
+              <a:rPr lang="en-US"/>
               <a:t>Click to edit Master subtitle style</a:t>
             </a:r>
-            <a:endParaRPr lang="en-US"/>
           </a:p>
         </p:txBody>
       </p:sp>
@@ -238,7 +241,7 @@
           <a:p>
             <a:fld id="{BFF66C8F-C718-445A-8096-D125CF74B861}" type="datetimeFigureOut">
               <a:rPr lang="en-US" smtClean="0"/>
-              <a:t>10/23/2018</a:t>
+              <a:t>9/16/2022</a:t>
             </a:fld>
             <a:endParaRPr lang="en-US"/>
           </a:p>
@@ -332,10 +335,9 @@
           <a:lstStyle/>
           <a:p>
             <a:r>
-              <a:rPr lang="en-US" smtClean="0"/>
+              <a:rPr lang="en-US"/>
               <a:t>Click to edit Master title style</a:t>
             </a:r>
-            <a:endParaRPr lang="en-US"/>
           </a:p>
         </p:txBody>
       </p:sp>
@@ -356,38 +358,37 @@
           <a:p>
             <a:pPr lvl="0"/>
             <a:r>
-              <a:rPr lang="en-US" smtClean="0"/>
+              <a:rPr lang="en-US"/>
               <a:t>Click to edit Master text styles</a:t>
             </a:r>
           </a:p>
           <a:p>
             <a:pPr lvl="1"/>
             <a:r>
-              <a:rPr lang="en-US" smtClean="0"/>
+              <a:rPr lang="en-US"/>
               <a:t>Second level</a:t>
             </a:r>
           </a:p>
           <a:p>
             <a:pPr lvl="2"/>
             <a:r>
-              <a:rPr lang="en-US" smtClean="0"/>
+              <a:rPr lang="en-US"/>
               <a:t>Third level</a:t>
             </a:r>
           </a:p>
           <a:p>
             <a:pPr lvl="3"/>
             <a:r>
-              <a:rPr lang="en-US" smtClean="0"/>
+              <a:rPr lang="en-US"/>
               <a:t>Fourth level</a:t>
             </a:r>
           </a:p>
           <a:p>
             <a:pPr lvl="4"/>
             <a:r>
-              <a:rPr lang="en-US" smtClean="0"/>
+              <a:rPr lang="en-US"/>
               <a:t>Fifth level</a:t>
             </a:r>
-            <a:endParaRPr lang="en-US"/>
           </a:p>
         </p:txBody>
       </p:sp>
@@ -408,7 +409,7 @@
           <a:p>
             <a:fld id="{BFF66C8F-C718-445A-8096-D125CF74B861}" type="datetimeFigureOut">
               <a:rPr lang="en-US" smtClean="0"/>
-              <a:t>10/23/2018</a:t>
+              <a:t>9/16/2022</a:t>
             </a:fld>
             <a:endParaRPr lang="en-US"/>
           </a:p>
@@ -507,10 +508,9 @@
           <a:lstStyle/>
           <a:p>
             <a:r>
-              <a:rPr lang="en-US" smtClean="0"/>
+              <a:rPr lang="en-US"/>
               <a:t>Click to edit Master title style</a:t>
             </a:r>
-            <a:endParaRPr lang="en-US"/>
           </a:p>
         </p:txBody>
       </p:sp>
@@ -536,38 +536,37 @@
           <a:p>
             <a:pPr lvl="0"/>
             <a:r>
-              <a:rPr lang="en-US" smtClean="0"/>
+              <a:rPr lang="en-US"/>
               <a:t>Click to edit Master text styles</a:t>
             </a:r>
           </a:p>
           <a:p>
             <a:pPr lvl="1"/>
             <a:r>
-              <a:rPr lang="en-US" smtClean="0"/>
+              <a:rPr lang="en-US"/>
               <a:t>Second level</a:t>
             </a:r>
           </a:p>
           <a:p>
             <a:pPr lvl="2"/>
             <a:r>
-              <a:rPr lang="en-US" smtClean="0"/>
+              <a:rPr lang="en-US"/>
               <a:t>Third level</a:t>
             </a:r>
           </a:p>
           <a:p>
             <a:pPr lvl="3"/>
             <a:r>
-              <a:rPr lang="en-US" smtClean="0"/>
+              <a:rPr lang="en-US"/>
               <a:t>Fourth level</a:t>
             </a:r>
           </a:p>
           <a:p>
             <a:pPr lvl="4"/>
             <a:r>
-              <a:rPr lang="en-US" smtClean="0"/>
+              <a:rPr lang="en-US"/>
               <a:t>Fifth level</a:t>
             </a:r>
-            <a:endParaRPr lang="en-US"/>
           </a:p>
         </p:txBody>
       </p:sp>
@@ -588,7 +587,7 @@
           <a:p>
             <a:fld id="{BFF66C8F-C718-445A-8096-D125CF74B861}" type="datetimeFigureOut">
               <a:rPr lang="en-US" smtClean="0"/>
-              <a:t>10/23/2018</a:t>
+              <a:t>9/16/2022</a:t>
             </a:fld>
             <a:endParaRPr lang="en-US"/>
           </a:p>
@@ -682,10 +681,9 @@
           <a:lstStyle/>
           <a:p>
             <a:r>
-              <a:rPr lang="en-US" smtClean="0"/>
+              <a:rPr lang="en-US"/>
               <a:t>Click to edit Master title style</a:t>
             </a:r>
-            <a:endParaRPr lang="en-US"/>
           </a:p>
         </p:txBody>
       </p:sp>
@@ -706,38 +704,37 @@
           <a:p>
             <a:pPr lvl="0"/>
             <a:r>
-              <a:rPr lang="en-US" smtClean="0"/>
+              <a:rPr lang="en-US"/>
               <a:t>Click to edit Master text styles</a:t>
             </a:r>
           </a:p>
           <a:p>
             <a:pPr lvl="1"/>
             <a:r>
-              <a:rPr lang="en-US" smtClean="0"/>
+              <a:rPr lang="en-US"/>
               <a:t>Second level</a:t>
             </a:r>
           </a:p>
           <a:p>
             <a:pPr lvl="2"/>
             <a:r>
-              <a:rPr lang="en-US" smtClean="0"/>
+              <a:rPr lang="en-US"/>
               <a:t>Third level</a:t>
             </a:r>
           </a:p>
           <a:p>
             <a:pPr lvl="3"/>
             <a:r>
-              <a:rPr lang="en-US" smtClean="0"/>
+              <a:rPr lang="en-US"/>
               <a:t>Fourth level</a:t>
             </a:r>
           </a:p>
           <a:p>
             <a:pPr lvl="4"/>
             <a:r>
-              <a:rPr lang="en-US" smtClean="0"/>
+              <a:rPr lang="en-US"/>
               <a:t>Fifth level</a:t>
             </a:r>
-            <a:endParaRPr lang="en-US"/>
           </a:p>
         </p:txBody>
       </p:sp>
@@ -758,7 +755,7 @@
           <a:p>
             <a:fld id="{BFF66C8F-C718-445A-8096-D125CF74B861}" type="datetimeFigureOut">
               <a:rPr lang="en-US" smtClean="0"/>
-              <a:t>10/23/2018</a:t>
+              <a:t>9/16/2022</a:t>
             </a:fld>
             <a:endParaRPr lang="en-US"/>
           </a:p>
@@ -861,10 +858,9 @@
           </a:lstStyle>
           <a:p>
             <a:r>
-              <a:rPr lang="en-US" smtClean="0"/>
+              <a:rPr lang="en-US"/>
               <a:t>Click to edit Master title style</a:t>
             </a:r>
-            <a:endParaRPr lang="en-US"/>
           </a:p>
         </p:txBody>
       </p:sp>
@@ -981,7 +977,7 @@
           <a:p>
             <a:pPr lvl="0"/>
             <a:r>
-              <a:rPr lang="en-US" smtClean="0"/>
+              <a:rPr lang="en-US"/>
               <a:t>Click to edit Master text styles</a:t>
             </a:r>
           </a:p>
@@ -1004,7 +1000,7 @@
           <a:p>
             <a:fld id="{BFF66C8F-C718-445A-8096-D125CF74B861}" type="datetimeFigureOut">
               <a:rPr lang="en-US" smtClean="0"/>
-              <a:t>10/23/2018</a:t>
+              <a:t>9/16/2022</a:t>
             </a:fld>
             <a:endParaRPr lang="en-US"/>
           </a:p>
@@ -1098,10 +1094,9 @@
           <a:lstStyle/>
           <a:p>
             <a:r>
-              <a:rPr lang="en-US" smtClean="0"/>
+              <a:rPr lang="en-US"/>
               <a:t>Click to edit Master title style</a:t>
             </a:r>
-            <a:endParaRPr lang="en-US"/>
           </a:p>
         </p:txBody>
       </p:sp>
@@ -1127,38 +1122,37 @@
           <a:p>
             <a:pPr lvl="0"/>
             <a:r>
-              <a:rPr lang="en-US" smtClean="0"/>
+              <a:rPr lang="en-US"/>
               <a:t>Click to edit Master text styles</a:t>
             </a:r>
           </a:p>
           <a:p>
             <a:pPr lvl="1"/>
             <a:r>
-              <a:rPr lang="en-US" smtClean="0"/>
+              <a:rPr lang="en-US"/>
               <a:t>Second level</a:t>
             </a:r>
           </a:p>
           <a:p>
             <a:pPr lvl="2"/>
             <a:r>
-              <a:rPr lang="en-US" smtClean="0"/>
+              <a:rPr lang="en-US"/>
               <a:t>Third level</a:t>
             </a:r>
           </a:p>
           <a:p>
             <a:pPr lvl="3"/>
             <a:r>
-              <a:rPr lang="en-US" smtClean="0"/>
+              <a:rPr lang="en-US"/>
               <a:t>Fourth level</a:t>
             </a:r>
           </a:p>
           <a:p>
             <a:pPr lvl="4"/>
             <a:r>
-              <a:rPr lang="en-US" smtClean="0"/>
+              <a:rPr lang="en-US"/>
               <a:t>Fifth level</a:t>
             </a:r>
-            <a:endParaRPr lang="en-US"/>
           </a:p>
         </p:txBody>
       </p:sp>
@@ -1184,38 +1178,37 @@
           <a:p>
             <a:pPr lvl="0"/>
             <a:r>
-              <a:rPr lang="en-US" smtClean="0"/>
+              <a:rPr lang="en-US"/>
               <a:t>Click to edit Master text styles</a:t>
             </a:r>
           </a:p>
           <a:p>
             <a:pPr lvl="1"/>
             <a:r>
-              <a:rPr lang="en-US" smtClean="0"/>
+              <a:rPr lang="en-US"/>
               <a:t>Second level</a:t>
             </a:r>
           </a:p>
           <a:p>
             <a:pPr lvl="2"/>
             <a:r>
-              <a:rPr lang="en-US" smtClean="0"/>
+              <a:rPr lang="en-US"/>
               <a:t>Third level</a:t>
             </a:r>
           </a:p>
           <a:p>
             <a:pPr lvl="3"/>
             <a:r>
-              <a:rPr lang="en-US" smtClean="0"/>
+              <a:rPr lang="en-US"/>
               <a:t>Fourth level</a:t>
             </a:r>
           </a:p>
           <a:p>
             <a:pPr lvl="4"/>
             <a:r>
-              <a:rPr lang="en-US" smtClean="0"/>
+              <a:rPr lang="en-US"/>
               <a:t>Fifth level</a:t>
             </a:r>
-            <a:endParaRPr lang="en-US"/>
           </a:p>
         </p:txBody>
       </p:sp>
@@ -1236,7 +1229,7 @@
           <a:p>
             <a:fld id="{BFF66C8F-C718-445A-8096-D125CF74B861}" type="datetimeFigureOut">
               <a:rPr lang="en-US" smtClean="0"/>
-              <a:t>10/23/2018</a:t>
+              <a:t>9/16/2022</a:t>
             </a:fld>
             <a:endParaRPr lang="en-US"/>
           </a:p>
@@ -1335,10 +1328,9 @@
           <a:lstStyle/>
           <a:p>
             <a:r>
-              <a:rPr lang="en-US" smtClean="0"/>
+              <a:rPr lang="en-US"/>
               <a:t>Click to edit Master title style</a:t>
             </a:r>
-            <a:endParaRPr lang="en-US"/>
           </a:p>
         </p:txBody>
       </p:sp>
@@ -1401,7 +1393,7 @@
           <a:p>
             <a:pPr lvl="0"/>
             <a:r>
-              <a:rPr lang="en-US" smtClean="0"/>
+              <a:rPr lang="en-US"/>
               <a:t>Click to edit Master text styles</a:t>
             </a:r>
           </a:p>
@@ -1429,38 +1421,37 @@
           <a:p>
             <a:pPr lvl="0"/>
             <a:r>
-              <a:rPr lang="en-US" smtClean="0"/>
+              <a:rPr lang="en-US"/>
               <a:t>Click to edit Master text styles</a:t>
             </a:r>
           </a:p>
           <a:p>
             <a:pPr lvl="1"/>
             <a:r>
-              <a:rPr lang="en-US" smtClean="0"/>
+              <a:rPr lang="en-US"/>
               <a:t>Second level</a:t>
             </a:r>
           </a:p>
           <a:p>
             <a:pPr lvl="2"/>
             <a:r>
-              <a:rPr lang="en-US" smtClean="0"/>
+              <a:rPr lang="en-US"/>
               <a:t>Third level</a:t>
             </a:r>
           </a:p>
           <a:p>
             <a:pPr lvl="3"/>
             <a:r>
-              <a:rPr lang="en-US" smtClean="0"/>
+              <a:rPr lang="en-US"/>
               <a:t>Fourth level</a:t>
             </a:r>
           </a:p>
           <a:p>
             <a:pPr lvl="4"/>
             <a:r>
-              <a:rPr lang="en-US" smtClean="0"/>
+              <a:rPr lang="en-US"/>
               <a:t>Fifth level</a:t>
             </a:r>
-            <a:endParaRPr lang="en-US"/>
           </a:p>
         </p:txBody>
       </p:sp>
@@ -1523,7 +1514,7 @@
           <a:p>
             <a:pPr lvl="0"/>
             <a:r>
-              <a:rPr lang="en-US" smtClean="0"/>
+              <a:rPr lang="en-US"/>
               <a:t>Click to edit Master text styles</a:t>
             </a:r>
           </a:p>
@@ -1551,38 +1542,37 @@
           <a:p>
             <a:pPr lvl="0"/>
             <a:r>
-              <a:rPr lang="en-US" smtClean="0"/>
+              <a:rPr lang="en-US"/>
               <a:t>Click to edit Master text styles</a:t>
             </a:r>
           </a:p>
           <a:p>
             <a:pPr lvl="1"/>
             <a:r>
-              <a:rPr lang="en-US" smtClean="0"/>
+              <a:rPr lang="en-US"/>
               <a:t>Second level</a:t>
             </a:r>
           </a:p>
           <a:p>
             <a:pPr lvl="2"/>
             <a:r>
-              <a:rPr lang="en-US" smtClean="0"/>
+              <a:rPr lang="en-US"/>
               <a:t>Third level</a:t>
             </a:r>
           </a:p>
           <a:p>
             <a:pPr lvl="3"/>
             <a:r>
-              <a:rPr lang="en-US" smtClean="0"/>
+              <a:rPr lang="en-US"/>
               <a:t>Fourth level</a:t>
             </a:r>
           </a:p>
           <a:p>
             <a:pPr lvl="4"/>
             <a:r>
-              <a:rPr lang="en-US" smtClean="0"/>
+              <a:rPr lang="en-US"/>
               <a:t>Fifth level</a:t>
             </a:r>
-            <a:endParaRPr lang="en-US"/>
           </a:p>
         </p:txBody>
       </p:sp>
@@ -1603,7 +1593,7 @@
           <a:p>
             <a:fld id="{BFF66C8F-C718-445A-8096-D125CF74B861}" type="datetimeFigureOut">
               <a:rPr lang="en-US" smtClean="0"/>
-              <a:t>10/23/2018</a:t>
+              <a:t>9/16/2022</a:t>
             </a:fld>
             <a:endParaRPr lang="en-US"/>
           </a:p>
@@ -1697,10 +1687,9 @@
           <a:lstStyle/>
           <a:p>
             <a:r>
-              <a:rPr lang="en-US" smtClean="0"/>
+              <a:rPr lang="en-US"/>
               <a:t>Click to edit Master title style</a:t>
             </a:r>
-            <a:endParaRPr lang="en-US"/>
           </a:p>
         </p:txBody>
       </p:sp>
@@ -1721,7 +1710,7 @@
           <a:p>
             <a:fld id="{BFF66C8F-C718-445A-8096-D125CF74B861}" type="datetimeFigureOut">
               <a:rPr lang="en-US" smtClean="0"/>
-              <a:t>10/23/2018</a:t>
+              <a:t>9/16/2022</a:t>
             </a:fld>
             <a:endParaRPr lang="en-US"/>
           </a:p>
@@ -1816,7 +1805,7 @@
           <a:p>
             <a:fld id="{BFF66C8F-C718-445A-8096-D125CF74B861}" type="datetimeFigureOut">
               <a:rPr lang="en-US" smtClean="0"/>
-              <a:t>10/23/2018</a:t>
+              <a:t>9/16/2022</a:t>
             </a:fld>
             <a:endParaRPr lang="en-US"/>
           </a:p>
@@ -1919,10 +1908,9 @@
           </a:lstStyle>
           <a:p>
             <a:r>
-              <a:rPr lang="en-US" smtClean="0"/>
+              <a:rPr lang="en-US"/>
               <a:t>Click to edit Master title style</a:t>
             </a:r>
-            <a:endParaRPr lang="en-US"/>
           </a:p>
         </p:txBody>
       </p:sp>
@@ -1976,38 +1964,37 @@
           <a:p>
             <a:pPr lvl="0"/>
             <a:r>
-              <a:rPr lang="en-US" smtClean="0"/>
+              <a:rPr lang="en-US"/>
               <a:t>Click to edit Master text styles</a:t>
             </a:r>
           </a:p>
           <a:p>
             <a:pPr lvl="1"/>
             <a:r>
-              <a:rPr lang="en-US" smtClean="0"/>
+              <a:rPr lang="en-US"/>
               <a:t>Second level</a:t>
             </a:r>
           </a:p>
           <a:p>
             <a:pPr lvl="2"/>
             <a:r>
-              <a:rPr lang="en-US" smtClean="0"/>
+              <a:rPr lang="en-US"/>
               <a:t>Third level</a:t>
             </a:r>
           </a:p>
           <a:p>
             <a:pPr lvl="3"/>
             <a:r>
-              <a:rPr lang="en-US" smtClean="0"/>
+              <a:rPr lang="en-US"/>
               <a:t>Fourth level</a:t>
             </a:r>
           </a:p>
           <a:p>
             <a:pPr lvl="4"/>
             <a:r>
-              <a:rPr lang="en-US" smtClean="0"/>
+              <a:rPr lang="en-US"/>
               <a:t>Fifth level</a:t>
             </a:r>
-            <a:endParaRPr lang="en-US"/>
           </a:p>
         </p:txBody>
       </p:sp>
@@ -2070,7 +2057,7 @@
           <a:p>
             <a:pPr lvl="0"/>
             <a:r>
-              <a:rPr lang="en-US" smtClean="0"/>
+              <a:rPr lang="en-US"/>
               <a:t>Click to edit Master text styles</a:t>
             </a:r>
           </a:p>
@@ -2093,7 +2080,7 @@
           <a:p>
             <a:fld id="{BFF66C8F-C718-445A-8096-D125CF74B861}" type="datetimeFigureOut">
               <a:rPr lang="en-US" smtClean="0"/>
-              <a:t>10/23/2018</a:t>
+              <a:t>9/16/2022</a:t>
             </a:fld>
             <a:endParaRPr lang="en-US"/>
           </a:p>
@@ -2196,10 +2183,9 @@
           </a:lstStyle>
           <a:p>
             <a:r>
-              <a:rPr lang="en-US" smtClean="0"/>
+              <a:rPr lang="en-US"/>
               <a:t>Click to edit Master title style</a:t>
             </a:r>
-            <a:endParaRPr lang="en-US"/>
           </a:p>
         </p:txBody>
       </p:sp>
@@ -2323,7 +2309,7 @@
           <a:p>
             <a:pPr lvl="0"/>
             <a:r>
-              <a:rPr lang="en-US" smtClean="0"/>
+              <a:rPr lang="en-US"/>
               <a:t>Click to edit Master text styles</a:t>
             </a:r>
           </a:p>
@@ -2346,7 +2332,7 @@
           <a:p>
             <a:fld id="{BFF66C8F-C718-445A-8096-D125CF74B861}" type="datetimeFigureOut">
               <a:rPr lang="en-US" smtClean="0"/>
-              <a:t>10/23/2018</a:t>
+              <a:t>9/16/2022</a:t>
             </a:fld>
             <a:endParaRPr lang="en-US"/>
           </a:p>
@@ -2455,10 +2441,9 @@
           <a:lstStyle/>
           <a:p>
             <a:r>
-              <a:rPr lang="en-US" smtClean="0"/>
+              <a:rPr lang="en-US"/>
               <a:t>Click to edit Master title style</a:t>
             </a:r>
-            <a:endParaRPr lang="en-US"/>
           </a:p>
         </p:txBody>
       </p:sp>
@@ -2489,38 +2474,37 @@
           <a:p>
             <a:pPr lvl="0"/>
             <a:r>
-              <a:rPr lang="en-US" smtClean="0"/>
+              <a:rPr lang="en-US"/>
               <a:t>Click to edit Master text styles</a:t>
             </a:r>
           </a:p>
           <a:p>
             <a:pPr lvl="1"/>
             <a:r>
-              <a:rPr lang="en-US" smtClean="0"/>
+              <a:rPr lang="en-US"/>
               <a:t>Second level</a:t>
             </a:r>
           </a:p>
           <a:p>
             <a:pPr lvl="2"/>
             <a:r>
-              <a:rPr lang="en-US" smtClean="0"/>
+              <a:rPr lang="en-US"/>
               <a:t>Third level</a:t>
             </a:r>
           </a:p>
           <a:p>
             <a:pPr lvl="3"/>
             <a:r>
-              <a:rPr lang="en-US" smtClean="0"/>
+              <a:rPr lang="en-US"/>
               <a:t>Fourth level</a:t>
             </a:r>
           </a:p>
           <a:p>
             <a:pPr lvl="4"/>
             <a:r>
-              <a:rPr lang="en-US" smtClean="0"/>
+              <a:rPr lang="en-US"/>
               <a:t>Fifth level</a:t>
             </a:r>
-            <a:endParaRPr lang="en-US"/>
           </a:p>
         </p:txBody>
       </p:sp>
@@ -2559,7 +2543,7 @@
           <a:p>
             <a:fld id="{BFF66C8F-C718-445A-8096-D125CF74B861}" type="datetimeFigureOut">
               <a:rPr lang="en-US" smtClean="0"/>
-              <a:t>10/23/2018</a:t>
+              <a:t>9/16/2022</a:t>
             </a:fld>
             <a:endParaRPr lang="en-US"/>
           </a:p>
@@ -3018,7 +3002,7 @@
           <a:p>
             <a:pPr algn="ctr"/>
             <a:r>
-              <a:rPr lang="en-US" sz="2800" b="1" dirty="0" err="1" smtClean="0">
+              <a:rPr lang="en-US" sz="2800" b="1" dirty="0" err="1">
                 <a:ln w="6600">
                   <a:solidFill>
                     <a:schemeClr val="accent2"/>
@@ -3037,7 +3021,7 @@
               <a:t>PeMS</a:t>
             </a:r>
             <a:r>
-              <a:rPr lang="en-US" sz="2800" b="1" dirty="0" smtClean="0">
+              <a:rPr lang="en-US" sz="2800" b="1" dirty="0">
                 <a:ln w="6600">
                   <a:solidFill>
                     <a:schemeClr val="accent2"/>
@@ -3059,7 +3043,7 @@
           <a:p>
             <a:pPr algn="ctr"/>
             <a:r>
-              <a:rPr lang="en-US" sz="2800" b="1" dirty="0" smtClean="0">
+              <a:rPr lang="en-US" sz="2800" b="1" dirty="0">
                 <a:ln w="6600">
                   <a:solidFill>
                     <a:schemeClr val="accent2"/>
@@ -3077,22 +3061,6 @@
               </a:rPr>
               <a:t>Clearinghouse</a:t>
             </a:r>
-            <a:endParaRPr lang="en-US" sz="2800" b="1" dirty="0">
-              <a:ln w="6600">
-                <a:solidFill>
-                  <a:schemeClr val="accent2"/>
-                </a:solidFill>
-                <a:prstDash val="solid"/>
-              </a:ln>
-              <a:solidFill>
-                <a:srgbClr val="FFFFFF"/>
-              </a:solidFill>
-              <a:effectLst>
-                <a:outerShdw dist="38100" dir="2700000" algn="tl" rotWithShape="0">
-                  <a:schemeClr val="accent2"/>
-                </a:outerShdw>
-              </a:effectLst>
-            </a:endParaRPr>
           </a:p>
         </p:txBody>
       </p:sp>
@@ -3133,25 +3101,24 @@
           <a:p>
             <a:pPr algn="ctr"/>
             <a:r>
-              <a:rPr lang="en-US" dirty="0" smtClean="0"/>
+              <a:rPr lang="en-US" dirty="0"/>
               <a:t>Raw hourly </a:t>
             </a:r>
             <a:r>
-              <a:rPr lang="en-US" dirty="0" err="1" smtClean="0"/>
+              <a:rPr lang="en-US" dirty="0" err="1"/>
               <a:t>PeMS</a:t>
             </a:r>
             <a:r>
-              <a:rPr lang="en-US" dirty="0" smtClean="0"/>
+              <a:rPr lang="en-US" dirty="0"/>
               <a:t> </a:t>
             </a:r>
           </a:p>
           <a:p>
             <a:pPr algn="ctr"/>
             <a:r>
-              <a:rPr lang="en-US" dirty="0" smtClean="0"/>
-              <a:t>D4 station data </a:t>
-            </a:r>
-            <a:endParaRPr lang="en-US" dirty="0"/>
+              <a:rPr lang="en-US" dirty="0"/>
+              <a:t>station data </a:t>
+            </a:r>
           </a:p>
         </p:txBody>
       </p:sp>
@@ -3192,15 +3159,24 @@
           <a:p>
             <a:pPr algn="ctr"/>
             <a:r>
-              <a:rPr lang="en-US" dirty="0" smtClean="0">
+              <a:rPr lang="en-US" dirty="0">
                 <a:latin typeface="Lucida Console" panose="020B0609040504020204" pitchFamily="49" charset="0"/>
               </a:rPr>
-              <a:t>Build_Annual_ Database.R</a:t>
-            </a:r>
-          </a:p>
-          <a:p>
-            <a:r>
-              <a:rPr lang="en-US" sz="1400" dirty="0" smtClean="0"/>
+              <a:t>summarize-to-hour-and-</a:t>
+            </a:r>
+            <a:r>
+              <a:rPr lang="en-US" dirty="0" err="1">
+                <a:latin typeface="Lucida Console" panose="020B0609040504020204" pitchFamily="49" charset="0"/>
+              </a:rPr>
+              <a:t>timeperiod.R</a:t>
+            </a:r>
+            <a:endParaRPr lang="en-US" dirty="0">
+              <a:latin typeface="Lucida Console" panose="020B0609040504020204" pitchFamily="49" charset="0"/>
+            </a:endParaRPr>
+          </a:p>
+          <a:p>
+            <a:r>
+              <a:rPr lang="en-US" sz="1400" dirty="0"/>
               <a:t>For a given year:</a:t>
             </a:r>
           </a:p>
@@ -3210,7 +3186,7 @@
               <a:buChar char="•"/>
             </a:pPr>
             <a:r>
-              <a:rPr lang="en-US" sz="1400" dirty="0" smtClean="0"/>
+              <a:rPr lang="en-US" sz="1400" dirty="0"/>
               <a:t>Filter to Tues, Wed, Thurs and non-holidays </a:t>
             </a:r>
           </a:p>
@@ -3220,7 +3196,7 @@
               <a:buChar char="•"/>
             </a:pPr>
             <a:r>
-              <a:rPr lang="en-US" sz="1400" dirty="0" smtClean="0"/>
+              <a:rPr lang="en-US" sz="1400" dirty="0"/>
               <a:t>Filter out suspect data</a:t>
             </a:r>
           </a:p>
@@ -3230,17 +3206,16 @@
               <a:buChar char="•"/>
             </a:pPr>
             <a:r>
-              <a:rPr lang="en-US" sz="1400" dirty="0" smtClean="0"/>
+              <a:rPr lang="en-US" sz="1400" dirty="0"/>
               <a:t>Summarize by time period</a:t>
             </a:r>
             <a:br>
-              <a:rPr lang="en-US" sz="1400" dirty="0" smtClean="0"/>
+              <a:rPr lang="en-US" sz="1400" dirty="0"/>
             </a:br>
             <a:r>
-              <a:rPr lang="en-US" sz="1400" dirty="0" smtClean="0"/>
+              <a:rPr lang="en-US" sz="1400" dirty="0"/>
               <a:t>and hour</a:t>
             </a:r>
-            <a:endParaRPr lang="en-US" sz="1400" dirty="0"/>
           </a:p>
         </p:txBody>
       </p:sp>
@@ -3281,22 +3256,30 @@
           <a:p>
             <a:pPr algn="ctr"/>
             <a:r>
-              <a:rPr lang="en-US" dirty="0" smtClean="0">
+              <a:rPr lang="en-US" dirty="0">
                 <a:latin typeface="Lucida Console" panose="020B0609040504020204" pitchFamily="49" charset="0"/>
               </a:rPr>
-              <a:t>Build_Database.R</a:t>
-            </a:r>
-          </a:p>
-          <a:p>
-            <a:endParaRPr lang="en-US" sz="1400" dirty="0" smtClean="0"/>
+              <a:t>combine-all-years-</a:t>
+            </a:r>
+            <a:r>
+              <a:rPr lang="en-US" dirty="0" err="1">
+                <a:latin typeface="Lucida Console" panose="020B0609040504020204" pitchFamily="49" charset="0"/>
+              </a:rPr>
+              <a:t>districts.R</a:t>
+            </a:r>
+            <a:endParaRPr lang="en-US" dirty="0">
+              <a:latin typeface="Lucida Console" panose="020B0609040504020204" pitchFamily="49" charset="0"/>
+            </a:endParaRPr>
+          </a:p>
+          <a:p>
+            <a:endParaRPr lang="en-US" sz="1400" dirty="0"/>
           </a:p>
           <a:p>
             <a:pPr algn="ctr"/>
             <a:r>
-              <a:rPr lang="en-US" sz="1400" dirty="0" smtClean="0"/>
-              <a:t>Combines annual databases</a:t>
-            </a:r>
-            <a:endParaRPr lang="en-US" sz="1400" dirty="0"/>
+              <a:rPr lang="en-US" sz="1400" dirty="0"/>
+              <a:t>Combines annual district files</a:t>
+            </a:r>
           </a:p>
         </p:txBody>
       </p:sp>
@@ -3338,8 +3321,8 @@
         </p:nvSpPr>
         <p:spPr>
           <a:xfrm>
-            <a:off x="9628839" y="1178014"/>
-            <a:ext cx="1946366" cy="1141639"/>
+            <a:off x="9359405" y="597818"/>
+            <a:ext cx="2386633" cy="1746216"/>
           </a:xfrm>
           <a:prstGeom prst="can">
             <a:avLst/>
@@ -3367,15 +3350,34 @@
           <a:p>
             <a:pPr algn="ctr"/>
             <a:r>
-              <a:rPr lang="en-US" dirty="0" smtClean="0"/>
-              <a:t>pems_hour.csv</a:t>
-            </a:r>
-          </a:p>
-          <a:p>
-            <a:pPr algn="ctr"/>
-            <a:r>
-              <a:rPr lang="en-US" dirty="0" smtClean="0"/>
-              <a:t>pems_period.csv</a:t>
+              <a:rPr lang="en-US" sz="1600" dirty="0" err="1"/>
+              <a:t>pems_hour</a:t>
+            </a:r>
+            <a:r>
+              <a:rPr lang="en-US" sz="1600" dirty="0"/>
+              <a:t>, </a:t>
+            </a:r>
+            <a:br>
+              <a:rPr lang="en-US" sz="1600" dirty="0"/>
+            </a:br>
+            <a:r>
+              <a:rPr lang="en-US" sz="1600" dirty="0" err="1"/>
+              <a:t>pems_period</a:t>
+            </a:r>
+            <a:br>
+              <a:rPr lang="en-US" sz="1600" dirty="0"/>
+            </a:br>
+            <a:r>
+              <a:rPr lang="en-US" sz="1600" dirty="0"/>
+              <a:t>(RDS, </a:t>
+            </a:r>
+            <a:r>
+              <a:rPr lang="en-US" sz="1600" dirty="0" err="1"/>
+              <a:t>Rdata</a:t>
+            </a:r>
+            <a:r>
+              <a:rPr lang="en-US" sz="1600" dirty="0"/>
+              <a:t>, csv)</a:t>
             </a:r>
           </a:p>
         </p:txBody>
@@ -3389,7 +3391,7 @@
         <p:spPr>
           <a:xfrm>
             <a:off x="9408705" y="2550483"/>
-            <a:ext cx="2386633" cy="523220"/>
+            <a:ext cx="2337333" cy="523220"/>
           </a:xfrm>
           <a:prstGeom prst="rect">
             <a:avLst/>
@@ -3406,12 +3408,9 @@
           <a:p>
             <a:pPr algn="ctr"/>
             <a:r>
-              <a:rPr lang="en-US" sz="1400" dirty="0" smtClean="0">
-                <a:hlinkClick r:id="rId4"/>
-              </a:rPr>
-              <a:t>https://mtcdrive.app.box.com/v/share-data</a:t>
-            </a:r>
-            <a:endParaRPr lang="en-US" sz="1400" dirty="0"/>
+              <a:rPr lang="en-US" sz="1400" dirty="0"/>
+              <a:t>https://mtcdrive.box.com/v/pems-typical-weekday</a:t>
+            </a:r>
           </a:p>
         </p:txBody>
       </p:sp>
@@ -3424,7 +3423,7 @@
           <p:nvPr/>
         </p:nvPicPr>
         <p:blipFill rotWithShape="1">
-          <a:blip r:embed="rId5"/>
+          <a:blip r:embed="rId4"/>
           <a:srcRect l="54613" t="4644" r="14386" b="12562"/>
           <a:stretch/>
         </p:blipFill>
@@ -3610,7 +3609,7 @@
           <a:p>
             <a:pPr algn="ctr"/>
             <a:r>
-              <a:rPr lang="en-US" sz="4000" b="1" dirty="0" smtClean="0">
+              <a:rPr lang="en-US" sz="4000" b="1" dirty="0">
                 <a:ln w="6600">
                   <a:solidFill>
                     <a:schemeClr val="accent2"/>
@@ -3679,13 +3678,6 @@
   <p:clrMapOvr>
     <a:masterClrMapping/>
   </p:clrMapOvr>
-  <p:timing>
-    <p:tnLst>
-      <p:par>
-        <p:cTn id="1" dur="indefinite" restart="never" nodeType="tmRoot"/>
-      </p:par>
-    </p:tnLst>
-  </p:timing>
 </p:sld>
 </file>
 

</xml_diff>